<commit_message>
script limpeza de dados IDS V1.1
</commit_message>
<xml_diff>
--- a/Presentation/Template.pptx
+++ b/Presentation/Template.pptx
@@ -5,17 +5,16 @@
     <p:sldMasterId id="2147483648" r:id="rId4"/>
   </p:sldMasterIdLst>
   <p:notesMasterIdLst>
-    <p:notesMasterId r:id="rId10"/>
+    <p:notesMasterId r:id="rId9"/>
   </p:notesMasterIdLst>
   <p:handoutMasterIdLst>
-    <p:handoutMasterId r:id="rId11"/>
+    <p:handoutMasterId r:id="rId10"/>
   </p:handoutMasterIdLst>
   <p:sldIdLst>
     <p:sldId id="256" r:id="rId5"/>
-    <p:sldId id="286" r:id="rId6"/>
-    <p:sldId id="287" r:id="rId7"/>
-    <p:sldId id="288" r:id="rId8"/>
-    <p:sldId id="289" r:id="rId9"/>
+    <p:sldId id="287" r:id="rId6"/>
+    <p:sldId id="288" r:id="rId7"/>
+    <p:sldId id="289" r:id="rId8"/>
   </p:sldIdLst>
   <p:sldSz cx="12192000" cy="6858000"/>
   <p:notesSz cx="6858000" cy="9144000"/>
@@ -219,7 +218,7 @@
           <a:p>
             <a:fld id="{B56F32FC-4BD9-442A-A8C6-51598C909FE3}" type="datetimeFigureOut">
               <a:rPr lang="en-US" smtClean="0"/>
-              <a:t>6/28/2025</a:t>
+              <a:t>8/14/2025</a:t>
             </a:fld>
             <a:endParaRPr lang="en-US" dirty="0"/>
           </a:p>
@@ -396,7 +395,7 @@
           <a:p>
             <a:fld id="{056371FA-A98D-41E8-93F4-09945841298A}" type="datetimeFigureOut">
               <a:rPr lang="en-US" smtClean="0"/>
-              <a:t>6/28/2025</a:t>
+              <a:t>8/14/2025</a:t>
             </a:fld>
             <a:endParaRPr lang="en-US" dirty="0"/>
           </a:p>
@@ -755,114 +754,6 @@
         <p:cNvPr id="1" name="">
           <a:extLst>
             <a:ext uri="{FF2B5EF4-FFF2-40B4-BE49-F238E27FC236}">
-              <a16:creationId xmlns:a16="http://schemas.microsoft.com/office/drawing/2014/main" id="{2B8940D8-83A0-0294-5A62-DE911F196593}"/>
-            </a:ext>
-          </a:extLst>
-        </p:cNvPr>
-        <p:cNvGrpSpPr/>
-        <p:nvPr/>
-      </p:nvGrpSpPr>
-      <p:grpSpPr>
-        <a:xfrm>
-          <a:off x="0" y="0"/>
-          <a:ext cx="0" cy="0"/>
-          <a:chOff x="0" y="0"/>
-          <a:chExt cx="0" cy="0"/>
-        </a:xfrm>
-      </p:grpSpPr>
-      <p:sp>
-        <p:nvSpPr>
-          <p:cNvPr id="2" name="Slide Image Placeholder 1">
-            <a:extLst>
-              <a:ext uri="{FF2B5EF4-FFF2-40B4-BE49-F238E27FC236}">
-                <a16:creationId xmlns:a16="http://schemas.microsoft.com/office/drawing/2014/main" id="{C9FD3E29-C727-AF41-75E4-18D49E11A5FC}"/>
-              </a:ext>
-            </a:extLst>
-          </p:cNvPr>
-          <p:cNvSpPr>
-            <a:spLocks noGrp="1" noRot="1" noChangeAspect="1"/>
-          </p:cNvSpPr>
-          <p:nvPr>
-            <p:ph type="sldImg"/>
-          </p:nvPr>
-        </p:nvSpPr>
-        <p:spPr/>
-      </p:sp>
-      <p:sp>
-        <p:nvSpPr>
-          <p:cNvPr id="3" name="Notes Placeholder 2">
-            <a:extLst>
-              <a:ext uri="{FF2B5EF4-FFF2-40B4-BE49-F238E27FC236}">
-                <a16:creationId xmlns:a16="http://schemas.microsoft.com/office/drawing/2014/main" id="{C4323092-670C-0957-221B-F5A79BD3E475}"/>
-              </a:ext>
-            </a:extLst>
-          </p:cNvPr>
-          <p:cNvSpPr>
-            <a:spLocks noGrp="1"/>
-          </p:cNvSpPr>
-          <p:nvPr>
-            <p:ph type="body" idx="1"/>
-          </p:nvPr>
-        </p:nvSpPr>
-        <p:spPr/>
-        <p:txBody>
-          <a:bodyPr/>
-          <a:lstStyle/>
-          <a:p>
-            <a:endParaRPr lang="en-US" dirty="0"/>
-          </a:p>
-        </p:txBody>
-      </p:sp>
-      <p:sp>
-        <p:nvSpPr>
-          <p:cNvPr id="4" name="Slide Number Placeholder 3">
-            <a:extLst>
-              <a:ext uri="{FF2B5EF4-FFF2-40B4-BE49-F238E27FC236}">
-                <a16:creationId xmlns:a16="http://schemas.microsoft.com/office/drawing/2014/main" id="{82E057FE-FDB0-500E-5292-4D04C80A64AD}"/>
-              </a:ext>
-            </a:extLst>
-          </p:cNvPr>
-          <p:cNvSpPr>
-            <a:spLocks noGrp="1"/>
-          </p:cNvSpPr>
-          <p:nvPr>
-            <p:ph type="sldNum" sz="quarter" idx="5"/>
-          </p:nvPr>
-        </p:nvSpPr>
-        <p:spPr/>
-        <p:txBody>
-          <a:bodyPr/>
-          <a:lstStyle/>
-          <a:p>
-            <a:fld id="{22289C57-55D7-40A4-A101-E74FAC7A092B}" type="slidenum">
-              <a:rPr lang="en-US" smtClean="0"/>
-              <a:t>2</a:t>
-            </a:fld>
-            <a:endParaRPr lang="en-US" dirty="0"/>
-          </a:p>
-        </p:txBody>
-      </p:sp>
-    </p:spTree>
-    <p:extLst>
-      <p:ext uri="{BB962C8B-B14F-4D97-AF65-F5344CB8AC3E}">
-        <p14:creationId xmlns:p14="http://schemas.microsoft.com/office/powerpoint/2010/main" val="3889810381"/>
-      </p:ext>
-    </p:extLst>
-  </p:cSld>
-  <p:clrMapOvr>
-    <a:masterClrMapping/>
-  </p:clrMapOvr>
-</p:notes>
-</file>
-
-<file path=ppt/notesSlides/notesSlide3.xml><?xml version="1.0" encoding="utf-8"?>
-<p:notes xmlns:a="http://schemas.openxmlformats.org/drawingml/2006/main" xmlns:r="http://schemas.openxmlformats.org/officeDocument/2006/relationships" xmlns:p="http://schemas.openxmlformats.org/presentationml/2006/main">
-  <p:cSld>
-    <p:spTree>
-      <p:nvGrpSpPr>
-        <p:cNvPr id="1" name="">
-          <a:extLst>
-            <a:ext uri="{FF2B5EF4-FFF2-40B4-BE49-F238E27FC236}">
               <a16:creationId xmlns:a16="http://schemas.microsoft.com/office/drawing/2014/main" id="{AE19AEFA-B1EC-AA3F-CC20-9EB772E67484}"/>
             </a:ext>
           </a:extLst>
@@ -944,7 +835,7 @@
           <a:p>
             <a:fld id="{22289C57-55D7-40A4-A101-E74FAC7A092B}" type="slidenum">
               <a:rPr lang="en-US" smtClean="0"/>
-              <a:t>3</a:t>
+              <a:t>2</a:t>
             </a:fld>
             <a:endParaRPr lang="en-US" dirty="0"/>
           </a:p>
@@ -963,7 +854,7 @@
 </p:notes>
 </file>
 
-<file path=ppt/notesSlides/notesSlide4.xml><?xml version="1.0" encoding="utf-8"?>
+<file path=ppt/notesSlides/notesSlide3.xml><?xml version="1.0" encoding="utf-8"?>
 <p:notes xmlns:a="http://schemas.openxmlformats.org/drawingml/2006/main" xmlns:r="http://schemas.openxmlformats.org/officeDocument/2006/relationships" xmlns:p="http://schemas.openxmlformats.org/presentationml/2006/main">
   <p:cSld>
     <p:spTree>
@@ -1052,7 +943,7 @@
           <a:p>
             <a:fld id="{22289C57-55D7-40A4-A101-E74FAC7A092B}" type="slidenum">
               <a:rPr lang="en-US" smtClean="0"/>
-              <a:t>4</a:t>
+              <a:t>3</a:t>
             </a:fld>
             <a:endParaRPr lang="en-US" dirty="0"/>
           </a:p>
@@ -1071,7 +962,7 @@
 </p:notes>
 </file>
 
-<file path=ppt/notesSlides/notesSlide5.xml><?xml version="1.0" encoding="utf-8"?>
+<file path=ppt/notesSlides/notesSlide4.xml><?xml version="1.0" encoding="utf-8"?>
 <p:notes xmlns:a="http://schemas.openxmlformats.org/drawingml/2006/main" xmlns:r="http://schemas.openxmlformats.org/officeDocument/2006/relationships" xmlns:p="http://schemas.openxmlformats.org/presentationml/2006/main">
   <p:cSld>
     <p:spTree>
@@ -1160,7 +1051,7 @@
           <a:p>
             <a:fld id="{22289C57-55D7-40A4-A101-E74FAC7A092B}" type="slidenum">
               <a:rPr lang="en-US" smtClean="0"/>
-              <a:t>5</a:t>
+              <a:t>4</a:t>
             </a:fld>
             <a:endParaRPr lang="en-US" dirty="0"/>
           </a:p>
@@ -6635,8 +6526,8 @@
         </p:nvSpPr>
         <p:spPr>
           <a:xfrm>
-            <a:off x="1114106" y="4705349"/>
-            <a:ext cx="10201594" cy="1800309"/>
+            <a:off x="1114105" y="4705349"/>
+            <a:ext cx="10745385" cy="1800309"/>
           </a:xfrm>
           <a:prstGeom prst="rect">
             <a:avLst/>
@@ -6667,7 +6558,7 @@
           </a:lstStyle>
           <a:p>
             <a:r>
-              <a:rPr lang="en-US" sz="5400" dirty="0">
+              <a:rPr lang="pt-BR" sz="5400" dirty="0">
                 <a:solidFill>
                   <a:schemeClr val="bg1"/>
                 </a:solidFill>
@@ -6675,30 +6566,16 @@
                 <a:ea typeface="ADLaM Display" panose="02010000000000000000" pitchFamily="2" charset="0"/>
                 <a:cs typeface="ADLaM Display" panose="02010000000000000000" pitchFamily="2" charset="0"/>
               </a:rPr>
-              <a:t>Dashboard de Vigilância </a:t>
-            </a:r>
-            <a:r>
-              <a:rPr lang="en-US" sz="5400" b="0" dirty="0">
-                <a:solidFill>
-                  <a:schemeClr val="bg1"/>
-                </a:solidFill>
-                <a:latin typeface="ADLaM Display" panose="02010000000000000000" pitchFamily="2" charset="0"/>
-                <a:ea typeface="ADLaM Display" panose="02010000000000000000" pitchFamily="2" charset="0"/>
-                <a:cs typeface="ADLaM Display" panose="02010000000000000000" pitchFamily="2" charset="0"/>
-              </a:rPr>
-              <a:t>SARS-CoV-2 &amp; Influenza</a:t>
-            </a:r>
-            <a:r>
-              <a:rPr lang="en-US" sz="5400" dirty="0">
-                <a:solidFill>
-                  <a:schemeClr val="bg1"/>
-                </a:solidFill>
-                <a:latin typeface="ADLaM Display" panose="02010000000000000000" pitchFamily="2" charset="0"/>
-                <a:ea typeface="ADLaM Display" panose="02010000000000000000" pitchFamily="2" charset="0"/>
-                <a:cs typeface="ADLaM Display" panose="02010000000000000000" pitchFamily="2" charset="0"/>
-              </a:rPr>
-              <a:t> </a:t>
-            </a:r>
+              <a:t>Dashboard de VIGILÂNCIA</a:t>
+            </a:r>
+            <a:endParaRPr lang="en-US" sz="5400" dirty="0">
+              <a:solidFill>
+                <a:schemeClr val="bg1"/>
+              </a:solidFill>
+              <a:latin typeface="ADLaM Display" panose="02010000000000000000" pitchFamily="2" charset="0"/>
+              <a:ea typeface="ADLaM Display" panose="02010000000000000000" pitchFamily="2" charset="0"/>
+              <a:cs typeface="ADLaM Display" panose="02010000000000000000" pitchFamily="2" charset="0"/>
+            </a:endParaRPr>
           </a:p>
         </p:txBody>
       </p:sp>
@@ -6866,294 +6743,6 @@
 </file>
 
 <file path=ppt/slides/slide2.xml><?xml version="1.0" encoding="utf-8"?>
-<p:sld xmlns:a="http://schemas.openxmlformats.org/drawingml/2006/main" xmlns:r="http://schemas.openxmlformats.org/officeDocument/2006/relationships" xmlns:p="http://schemas.openxmlformats.org/presentationml/2006/main">
-  <p:cSld>
-    <p:spTree>
-      <p:nvGrpSpPr>
-        <p:cNvPr id="1" name="">
-          <a:extLst>
-            <a:ext uri="{FF2B5EF4-FFF2-40B4-BE49-F238E27FC236}">
-              <a16:creationId xmlns:a16="http://schemas.microsoft.com/office/drawing/2014/main" id="{5E073D9D-0402-66F6-48B7-7ECF6702015B}"/>
-            </a:ext>
-          </a:extLst>
-        </p:cNvPr>
-        <p:cNvGrpSpPr/>
-        <p:nvPr/>
-      </p:nvGrpSpPr>
-      <p:grpSpPr>
-        <a:xfrm>
-          <a:off x="0" y="0"/>
-          <a:ext cx="0" cy="0"/>
-          <a:chOff x="0" y="0"/>
-          <a:chExt cx="0" cy="0"/>
-        </a:xfrm>
-      </p:grpSpPr>
-      <p:pic>
-        <p:nvPicPr>
-          <p:cNvPr id="4" name="Picture 3">
-            <a:extLst>
-              <a:ext uri="{FF2B5EF4-FFF2-40B4-BE49-F238E27FC236}">
-                <a16:creationId xmlns:a16="http://schemas.microsoft.com/office/drawing/2014/main" id="{7D4D079C-AA57-71BC-BEB6-6FB2E2D70798}"/>
-              </a:ext>
-            </a:extLst>
-          </p:cNvPr>
-          <p:cNvPicPr>
-            <a:picLocks noChangeAspect="1"/>
-          </p:cNvPicPr>
-          <p:nvPr/>
-        </p:nvPicPr>
-        <p:blipFill>
-          <a:blip r:embed="rId3"/>
-          <a:stretch>
-            <a:fillRect/>
-          </a:stretch>
-        </p:blipFill>
-        <p:spPr>
-          <a:xfrm>
-            <a:off x="237965" y="285668"/>
-            <a:ext cx="2286319" cy="1200318"/>
-          </a:xfrm>
-          <a:prstGeom prst="rect">
-            <a:avLst/>
-          </a:prstGeom>
-        </p:spPr>
-      </p:pic>
-      <p:sp>
-        <p:nvSpPr>
-          <p:cNvPr id="5" name="Rectangle 4">
-            <a:extLst>
-              <a:ext uri="{FF2B5EF4-FFF2-40B4-BE49-F238E27FC236}">
-                <a16:creationId xmlns:a16="http://schemas.microsoft.com/office/drawing/2014/main" id="{3096E891-C590-A887-20D8-18E692F369F1}"/>
-              </a:ext>
-            </a:extLst>
-          </p:cNvPr>
-          <p:cNvSpPr/>
-          <p:nvPr/>
-        </p:nvSpPr>
-        <p:spPr>
-          <a:xfrm>
-            <a:off x="0" y="4572001"/>
-            <a:ext cx="12192000" cy="2286000"/>
-          </a:xfrm>
-          <a:prstGeom prst="rect">
-            <a:avLst/>
-          </a:prstGeom>
-          <a:solidFill>
-            <a:srgbClr val="007489"/>
-          </a:solidFill>
-        </p:spPr>
-        <p:style>
-          <a:lnRef idx="2">
-            <a:schemeClr val="accent1">
-              <a:shade val="15000"/>
-            </a:schemeClr>
-          </a:lnRef>
-          <a:fillRef idx="1">
-            <a:schemeClr val="accent1"/>
-          </a:fillRef>
-          <a:effectRef idx="0">
-            <a:schemeClr val="accent1"/>
-          </a:effectRef>
-          <a:fontRef idx="minor">
-            <a:schemeClr val="lt1"/>
-          </a:fontRef>
-        </p:style>
-        <p:txBody>
-          <a:bodyPr rtlCol="0" anchor="ctr"/>
-          <a:lstStyle/>
-          <a:p>
-            <a:pPr algn="ctr"/>
-            <a:endParaRPr lang="pt-PT" dirty="0"/>
-          </a:p>
-        </p:txBody>
-      </p:sp>
-      <p:sp>
-        <p:nvSpPr>
-          <p:cNvPr id="8" name="Title 1">
-            <a:extLst>
-              <a:ext uri="{FF2B5EF4-FFF2-40B4-BE49-F238E27FC236}">
-                <a16:creationId xmlns:a16="http://schemas.microsoft.com/office/drawing/2014/main" id="{E1E87C12-24A9-FB1A-C113-6F2D9904AFC1}"/>
-              </a:ext>
-            </a:extLst>
-          </p:cNvPr>
-          <p:cNvSpPr txBox="1">
-            <a:spLocks/>
-          </p:cNvSpPr>
-          <p:nvPr/>
-        </p:nvSpPr>
-        <p:spPr>
-          <a:xfrm>
-            <a:off x="1114106" y="4705349"/>
-            <a:ext cx="10201594" cy="1800309"/>
-          </a:xfrm>
-          <a:prstGeom prst="rect">
-            <a:avLst/>
-          </a:prstGeom>
-        </p:spPr>
-        <p:txBody>
-          <a:bodyPr vert="horz" lIns="91440" tIns="45720" rIns="91440" bIns="45720" rtlCol="0" anchor="ctr">
-            <a:noAutofit/>
-          </a:bodyPr>
-          <a:lstStyle>
-            <a:lvl1pPr algn="l" defTabSz="914400" rtl="0" eaLnBrk="1" latinLnBrk="0" hangingPunct="1">
-              <a:lnSpc>
-                <a:spcPct val="90000"/>
-              </a:lnSpc>
-              <a:spcBef>
-                <a:spcPct val="0"/>
-              </a:spcBef>
-              <a:buNone/>
-              <a:defRPr sz="3600" kern="1200" cap="all" spc="150" baseline="0">
-                <a:solidFill>
-                  <a:schemeClr val="tx1"/>
-                </a:solidFill>
-                <a:latin typeface="+mj-lt"/>
-                <a:ea typeface="+mj-ea"/>
-                <a:cs typeface="+mj-cs"/>
-              </a:defRPr>
-            </a:lvl1pPr>
-          </a:lstStyle>
-          <a:p>
-            <a:r>
-              <a:rPr lang="en-US" sz="5400" dirty="0">
-                <a:solidFill>
-                  <a:schemeClr val="bg1"/>
-                </a:solidFill>
-                <a:latin typeface="ADLaM Display" panose="02010000000000000000" pitchFamily="2" charset="0"/>
-                <a:ea typeface="ADLaM Display" panose="02010000000000000000" pitchFamily="2" charset="0"/>
-                <a:cs typeface="ADLaM Display" panose="02010000000000000000" pitchFamily="2" charset="0"/>
-              </a:rPr>
-              <a:t>Dashboard </a:t>
-            </a:r>
-            <a:r>
-              <a:rPr lang="en-US" sz="5400" b="0" dirty="0">
-                <a:solidFill>
-                  <a:schemeClr val="bg1"/>
-                </a:solidFill>
-                <a:latin typeface="ADLaM Display" panose="02010000000000000000" pitchFamily="2" charset="0"/>
-                <a:ea typeface="ADLaM Display" panose="02010000000000000000" pitchFamily="2" charset="0"/>
-                <a:cs typeface="ADLaM Display" panose="02010000000000000000" pitchFamily="2" charset="0"/>
-              </a:rPr>
-              <a:t>Influenza</a:t>
-            </a:r>
-            <a:r>
-              <a:rPr lang="en-US" sz="5400" dirty="0">
-                <a:solidFill>
-                  <a:schemeClr val="bg1"/>
-                </a:solidFill>
-                <a:latin typeface="ADLaM Display" panose="02010000000000000000" pitchFamily="2" charset="0"/>
-                <a:ea typeface="ADLaM Display" panose="02010000000000000000" pitchFamily="2" charset="0"/>
-                <a:cs typeface="ADLaM Display" panose="02010000000000000000" pitchFamily="2" charset="0"/>
-              </a:rPr>
-              <a:t> </a:t>
-            </a:r>
-          </a:p>
-        </p:txBody>
-      </p:sp>
-      <p:pic>
-        <p:nvPicPr>
-          <p:cNvPr id="3" name="Picture 2" descr="A close-up of a virus&#10;&#10;AI-generated content may be incorrect.">
-            <a:extLst>
-              <a:ext uri="{FF2B5EF4-FFF2-40B4-BE49-F238E27FC236}">
-                <a16:creationId xmlns:a16="http://schemas.microsoft.com/office/drawing/2014/main" id="{071C103A-CA3A-1570-CB1A-480FFB99529D}"/>
-              </a:ext>
-            </a:extLst>
-          </p:cNvPr>
-          <p:cNvPicPr>
-            <a:picLocks noChangeAspect="1"/>
-          </p:cNvPicPr>
-          <p:nvPr/>
-        </p:nvPicPr>
-        <p:blipFill>
-          <a:blip r:embed="rId4"/>
-          <a:stretch>
-            <a:fillRect/>
-          </a:stretch>
-        </p:blipFill>
-        <p:spPr>
-          <a:xfrm>
-            <a:off x="8158162" y="514267"/>
-            <a:ext cx="2847975" cy="1600200"/>
-          </a:xfrm>
-          <a:prstGeom prst="rect">
-            <a:avLst/>
-          </a:prstGeom>
-        </p:spPr>
-      </p:pic>
-      <p:pic>
-        <p:nvPicPr>
-          <p:cNvPr id="6" name="Picture 5">
-            <a:extLst>
-              <a:ext uri="{FF2B5EF4-FFF2-40B4-BE49-F238E27FC236}">
-                <a16:creationId xmlns:a16="http://schemas.microsoft.com/office/drawing/2014/main" id="{2971FF15-01FF-C45A-156C-6DEB1944B3F6}"/>
-              </a:ext>
-            </a:extLst>
-          </p:cNvPr>
-          <p:cNvPicPr>
-            <a:picLocks noChangeAspect="1"/>
-          </p:cNvPicPr>
-          <p:nvPr/>
-        </p:nvPicPr>
-        <p:blipFill>
-          <a:blip r:embed="rId4"/>
-          <a:stretch>
-            <a:fillRect/>
-          </a:stretch>
-        </p:blipFill>
-        <p:spPr>
-          <a:xfrm>
-            <a:off x="8158162" y="3216413"/>
-            <a:ext cx="1395413" cy="784045"/>
-          </a:xfrm>
-          <a:prstGeom prst="rect">
-            <a:avLst/>
-          </a:prstGeom>
-        </p:spPr>
-      </p:pic>
-      <p:pic>
-        <p:nvPicPr>
-          <p:cNvPr id="7" name="Picture 6">
-            <a:extLst>
-              <a:ext uri="{FF2B5EF4-FFF2-40B4-BE49-F238E27FC236}">
-                <a16:creationId xmlns:a16="http://schemas.microsoft.com/office/drawing/2014/main" id="{F3B1787F-0908-1C8C-3D4C-4C360738C02D}"/>
-              </a:ext>
-            </a:extLst>
-          </p:cNvPr>
-          <p:cNvPicPr>
-            <a:picLocks noChangeAspect="1"/>
-          </p:cNvPicPr>
-          <p:nvPr/>
-        </p:nvPicPr>
-        <p:blipFill>
-          <a:blip r:embed="rId4"/>
-          <a:stretch>
-            <a:fillRect/>
-          </a:stretch>
-        </p:blipFill>
-        <p:spPr>
-          <a:xfrm>
-            <a:off x="9988152" y="2411342"/>
-            <a:ext cx="2035970" cy="1143957"/>
-          </a:xfrm>
-          <a:prstGeom prst="rect">
-            <a:avLst/>
-          </a:prstGeom>
-        </p:spPr>
-      </p:pic>
-    </p:spTree>
-    <p:extLst>
-      <p:ext uri="{BB962C8B-B14F-4D97-AF65-F5344CB8AC3E}">
-        <p14:creationId xmlns:p14="http://schemas.microsoft.com/office/powerpoint/2010/main" val="3013922015"/>
-      </p:ext>
-    </p:extLst>
-  </p:cSld>
-  <p:clrMapOvr>
-    <a:masterClrMapping/>
-  </p:clrMapOvr>
-</p:sld>
-</file>
-
-<file path=ppt/slides/slide3.xml><?xml version="1.0" encoding="utf-8"?>
 <p:sld xmlns:a="http://schemas.openxmlformats.org/drawingml/2006/main" xmlns:r="http://schemas.openxmlformats.org/officeDocument/2006/relationships" xmlns:p="http://schemas.openxmlformats.org/presentationml/2006/main">
   <p:cSld>
     <p:spTree>
@@ -7271,8 +6860,8 @@
         </p:nvSpPr>
         <p:spPr>
           <a:xfrm>
-            <a:off x="1114106" y="4705349"/>
-            <a:ext cx="10201594" cy="1800309"/>
+            <a:off x="1066480" y="4572001"/>
+            <a:ext cx="10915969" cy="1800309"/>
           </a:xfrm>
           <a:prstGeom prst="rect">
             <a:avLst/>
@@ -7311,42 +6900,7 @@
                 <a:ea typeface="ADLaM Display" panose="02010000000000000000" pitchFamily="2" charset="0"/>
                 <a:cs typeface="ADLaM Display" panose="02010000000000000000" pitchFamily="2" charset="0"/>
               </a:rPr>
-              <a:t>Dashboard de Vigilância</a:t>
-            </a:r>
-          </a:p>
-          <a:p>
-            <a:r>
-              <a:rPr lang="en-US" sz="5400" dirty="0">
-                <a:solidFill>
-                  <a:schemeClr val="bg1"/>
-                </a:solidFill>
-                <a:latin typeface="ADLaM Display" panose="02010000000000000000" pitchFamily="2" charset="0"/>
-                <a:ea typeface="ADLaM Display" panose="02010000000000000000" pitchFamily="2" charset="0"/>
-                <a:cs typeface="ADLaM Display" panose="02010000000000000000" pitchFamily="2" charset="0"/>
-              </a:rPr>
-              <a:t> </a:t>
-            </a:r>
-            <a:r>
-              <a:rPr lang="en-US" sz="5400" b="0" dirty="0">
-                <a:solidFill>
-                  <a:schemeClr val="bg1"/>
-                </a:solidFill>
-                <a:latin typeface="ADLaM Display" panose="02010000000000000000" pitchFamily="2" charset="0"/>
-                <a:ea typeface="ADLaM Display" panose="02010000000000000000" pitchFamily="2" charset="0"/>
-                <a:cs typeface="ADLaM Display" panose="02010000000000000000" pitchFamily="2" charset="0"/>
-              </a:rPr>
-              <a:t>Tifóide</a:t>
-            </a:r>
-            <a:r>
-              <a:rPr lang="en-US" sz="5400" dirty="0">
-                <a:solidFill>
-                  <a:schemeClr val="bg1"/>
-                </a:solidFill>
-                <a:latin typeface="ADLaM Display" panose="02010000000000000000" pitchFamily="2" charset="0"/>
-                <a:ea typeface="ADLaM Display" panose="02010000000000000000" pitchFamily="2" charset="0"/>
-                <a:cs typeface="ADLaM Display" panose="02010000000000000000" pitchFamily="2" charset="0"/>
-              </a:rPr>
-              <a:t> </a:t>
+              <a:t>Dashboard de Febre Aguda </a:t>
             </a:r>
           </a:p>
         </p:txBody>
@@ -7436,7 +6990,7 @@
 </p:sld>
 </file>
 
-<file path=ppt/slides/slide4.xml><?xml version="1.0" encoding="utf-8"?>
+<file path=ppt/slides/slide3.xml><?xml version="1.0" encoding="utf-8"?>
 <p:sld xmlns:a="http://schemas.openxmlformats.org/drawingml/2006/main" xmlns:r="http://schemas.openxmlformats.org/officeDocument/2006/relationships" xmlns:p="http://schemas.openxmlformats.org/presentationml/2006/main">
   <p:cSld>
     <p:spTree>
@@ -7726,7 +7280,7 @@
 </p:sld>
 </file>
 
-<file path=ppt/slides/slide5.xml><?xml version="1.0" encoding="utf-8"?>
+<file path=ppt/slides/slide4.xml><?xml version="1.0" encoding="utf-8"?>
 <p:sld xmlns:a="http://schemas.openxmlformats.org/drawingml/2006/main" xmlns:r="http://schemas.openxmlformats.org/officeDocument/2006/relationships" xmlns:p="http://schemas.openxmlformats.org/presentationml/2006/main">
   <p:cSld>
     <p:spTree>

</xml_diff>